<commit_message>
update session 07 slides
</commit_message>
<xml_diff>
--- a/slides/Session 07 - Machine Learning Overview.pptx
+++ b/slides/Session 07 - Machine Learning Overview.pptx
@@ -5,22 +5,24 @@
     <p:sldMasterId id="2147483648" r:id="rId1"/>
   </p:sldMasterIdLst>
   <p:notesMasterIdLst>
-    <p:notesMasterId r:id="rId12"/>
+    <p:notesMasterId r:id="rId14"/>
   </p:notesMasterIdLst>
   <p:handoutMasterIdLst>
-    <p:handoutMasterId r:id="rId13"/>
+    <p:handoutMasterId r:id="rId15"/>
   </p:handoutMasterIdLst>
   <p:sldIdLst>
     <p:sldId id="256" r:id="rId2"/>
     <p:sldId id="258" r:id="rId3"/>
     <p:sldId id="362" r:id="rId4"/>
-    <p:sldId id="366" r:id="rId5"/>
+    <p:sldId id="367" r:id="rId5"/>
     <p:sldId id="363" r:id="rId6"/>
-    <p:sldId id="367" r:id="rId7"/>
+    <p:sldId id="368" r:id="rId7"/>
     <p:sldId id="259" r:id="rId8"/>
     <p:sldId id="364" r:id="rId9"/>
-    <p:sldId id="365" r:id="rId10"/>
-    <p:sldId id="270" r:id="rId11"/>
+    <p:sldId id="369" r:id="rId10"/>
+    <p:sldId id="366" r:id="rId11"/>
+    <p:sldId id="365" r:id="rId12"/>
+    <p:sldId id="270" r:id="rId13"/>
   </p:sldIdLst>
   <p:sldSz cx="12192000" cy="6858000"/>
   <p:notesSz cx="7104063" cy="10234613"/>
@@ -760,7 +762,7 @@
     </p:spTree>
     <p:extLst>
       <p:ext uri="{BB962C8B-B14F-4D97-AF65-F5344CB8AC3E}">
-        <p14:creationId xmlns:p14="http://schemas.microsoft.com/office/powerpoint/2010/main" val="3976567665"/>
+        <p14:creationId xmlns:p14="http://schemas.microsoft.com/office/powerpoint/2010/main" val="2675520828"/>
       </p:ext>
     </p:extLst>
   </p:cSld>
@@ -821,7 +823,7 @@
     </p:spTree>
     <p:extLst>
       <p:ext uri="{BB962C8B-B14F-4D97-AF65-F5344CB8AC3E}">
-        <p14:creationId xmlns:p14="http://schemas.microsoft.com/office/powerpoint/2010/main" val="1278212483"/>
+        <p14:creationId xmlns:p14="http://schemas.microsoft.com/office/powerpoint/2010/main" val="2562151963"/>
       </p:ext>
     </p:extLst>
   </p:cSld>
@@ -883,6 +885,128 @@
     <p:extLst>
       <p:ext uri="{BB962C8B-B14F-4D97-AF65-F5344CB8AC3E}">
         <p14:creationId xmlns:p14="http://schemas.microsoft.com/office/powerpoint/2010/main" val="1707049123"/>
+      </p:ext>
+    </p:extLst>
+  </p:cSld>
+  <p:clrMapOvr>
+    <a:masterClrMapping/>
+  </p:clrMapOvr>
+</p:notes>
+</file>
+
+<file path=ppt/notesSlides/notesSlide5.xml><?xml version="1.0" encoding="utf-8"?>
+<p:notes xmlns:a="http://schemas.openxmlformats.org/drawingml/2006/main" xmlns:r="http://schemas.openxmlformats.org/officeDocument/2006/relationships" xmlns:p="http://schemas.openxmlformats.org/presentationml/2006/main">
+  <p:cSld>
+    <p:spTree>
+      <p:nvGrpSpPr>
+        <p:cNvPr id="1" name=""/>
+        <p:cNvGrpSpPr/>
+        <p:nvPr/>
+      </p:nvGrpSpPr>
+      <p:grpSpPr>
+        <a:xfrm>
+          <a:off x="0" y="0"/>
+          <a:ext cx="0" cy="0"/>
+          <a:chOff x="0" y="0"/>
+          <a:chExt cx="0" cy="0"/>
+        </a:xfrm>
+      </p:grpSpPr>
+      <p:sp>
+        <p:nvSpPr>
+          <p:cNvPr id="2" name="Slide Image Placeholder 1"/>
+          <p:cNvSpPr>
+            <a:spLocks noGrp="1" noRot="1" noChangeAspect="1"/>
+          </p:cNvSpPr>
+          <p:nvPr>
+            <p:ph type="sldImg" idx="2"/>
+          </p:nvPr>
+        </p:nvSpPr>
+        <p:spPr/>
+      </p:sp>
+      <p:sp>
+        <p:nvSpPr>
+          <p:cNvPr id="3" name="Text Placeholder 2"/>
+          <p:cNvSpPr>
+            <a:spLocks noGrp="1"/>
+          </p:cNvSpPr>
+          <p:nvPr>
+            <p:ph type="body" idx="3"/>
+          </p:nvPr>
+        </p:nvSpPr>
+        <p:spPr/>
+        <p:txBody>
+          <a:bodyPr/>
+          <a:lstStyle/>
+          <a:p>
+            <a:endParaRPr lang="en-US" dirty="0"/>
+          </a:p>
+        </p:txBody>
+      </p:sp>
+    </p:spTree>
+    <p:extLst>
+      <p:ext uri="{BB962C8B-B14F-4D97-AF65-F5344CB8AC3E}">
+        <p14:creationId xmlns:p14="http://schemas.microsoft.com/office/powerpoint/2010/main" val="2017836680"/>
+      </p:ext>
+    </p:extLst>
+  </p:cSld>
+  <p:clrMapOvr>
+    <a:masterClrMapping/>
+  </p:clrMapOvr>
+</p:notes>
+</file>
+
+<file path=ppt/notesSlides/notesSlide6.xml><?xml version="1.0" encoding="utf-8"?>
+<p:notes xmlns:a="http://schemas.openxmlformats.org/drawingml/2006/main" xmlns:r="http://schemas.openxmlformats.org/officeDocument/2006/relationships" xmlns:p="http://schemas.openxmlformats.org/presentationml/2006/main">
+  <p:cSld>
+    <p:spTree>
+      <p:nvGrpSpPr>
+        <p:cNvPr id="1" name=""/>
+        <p:cNvGrpSpPr/>
+        <p:nvPr/>
+      </p:nvGrpSpPr>
+      <p:grpSpPr>
+        <a:xfrm>
+          <a:off x="0" y="0"/>
+          <a:ext cx="0" cy="0"/>
+          <a:chOff x="0" y="0"/>
+          <a:chExt cx="0" cy="0"/>
+        </a:xfrm>
+      </p:grpSpPr>
+      <p:sp>
+        <p:nvSpPr>
+          <p:cNvPr id="2" name="Slide Image Placeholder 1"/>
+          <p:cNvSpPr>
+            <a:spLocks noGrp="1" noRot="1" noChangeAspect="1"/>
+          </p:cNvSpPr>
+          <p:nvPr>
+            <p:ph type="sldImg" idx="2"/>
+          </p:nvPr>
+        </p:nvSpPr>
+        <p:spPr/>
+      </p:sp>
+      <p:sp>
+        <p:nvSpPr>
+          <p:cNvPr id="3" name="Text Placeholder 2"/>
+          <p:cNvSpPr>
+            <a:spLocks noGrp="1"/>
+          </p:cNvSpPr>
+          <p:nvPr>
+            <p:ph type="body" idx="3"/>
+          </p:nvPr>
+        </p:nvSpPr>
+        <p:spPr/>
+        <p:txBody>
+          <a:bodyPr/>
+          <a:lstStyle/>
+          <a:p>
+            <a:endParaRPr lang="en-US" dirty="0"/>
+          </a:p>
+        </p:txBody>
+      </p:sp>
+    </p:spTree>
+    <p:extLst>
+      <p:ext uri="{BB962C8B-B14F-4D97-AF65-F5344CB8AC3E}">
+        <p14:creationId xmlns:p14="http://schemas.microsoft.com/office/powerpoint/2010/main" val="2708130100"/>
       </p:ext>
     </p:extLst>
   </p:cSld>
@@ -4353,6 +4477,234 @@
             <p:ph type="title"/>
           </p:nvPr>
         </p:nvSpPr>
+        <p:spPr/>
+        <p:txBody>
+          <a:bodyPr/>
+          <a:lstStyle/>
+          <a:p>
+            <a:pPr algn="l"/>
+            <a:r>
+              <a:rPr lang="en-US" dirty="0">
+                <a:latin typeface="Ubuntu" panose="020B0504030602030204" charset="0"/>
+                <a:cs typeface="Ubuntu" panose="020B0504030602030204" charset="0"/>
+              </a:rPr>
+              <a:t>Confusion Matrix</a:t>
+            </a:r>
+          </a:p>
+        </p:txBody>
+      </p:sp>
+      <p:pic>
+        <p:nvPicPr>
+          <p:cNvPr id="5" name="Content Placeholder 4" descr="A chart with different colored squares&#10;&#10;Description automatically generated">
+            <a:extLst>
+              <a:ext uri="{FF2B5EF4-FFF2-40B4-BE49-F238E27FC236}">
+                <a16:creationId xmlns:a16="http://schemas.microsoft.com/office/drawing/2014/main" id="{E88D6CC5-A393-5D6A-961F-9FA77780442A}"/>
+              </a:ext>
+            </a:extLst>
+          </p:cNvPr>
+          <p:cNvPicPr>
+            <a:picLocks noGrp="1" noChangeAspect="1"/>
+          </p:cNvPicPr>
+          <p:nvPr>
+            <p:ph idx="1"/>
+          </p:nvPr>
+        </p:nvPicPr>
+        <p:blipFill>
+          <a:blip r:embed="rId3">
+            <a:extLst>
+              <a:ext uri="{28A0092B-C50C-407E-A947-70E740481C1C}">
+                <a14:useLocalDpi xmlns:a14="http://schemas.microsoft.com/office/drawing/2010/main" val="0"/>
+              </a:ext>
+            </a:extLst>
+          </a:blip>
+          <a:stretch>
+            <a:fillRect/>
+          </a:stretch>
+        </p:blipFill>
+        <p:spPr>
+          <a:xfrm>
+            <a:off x="1835580" y="1531938"/>
+            <a:ext cx="8520840" cy="4477289"/>
+          </a:xfrm>
+        </p:spPr>
+      </p:pic>
+    </p:spTree>
+    <p:extLst>
+      <p:ext uri="{BB962C8B-B14F-4D97-AF65-F5344CB8AC3E}">
+        <p14:creationId xmlns:p14="http://schemas.microsoft.com/office/powerpoint/2010/main" val="1910178666"/>
+      </p:ext>
+    </p:extLst>
+  </p:cSld>
+  <p:clrMapOvr>
+    <a:masterClrMapping/>
+  </p:clrMapOvr>
+  <mc:AlternateContent xmlns:mc="http://schemas.openxmlformats.org/markup-compatibility/2006">
+    <mc:Choice xmlns:p14="http://schemas.microsoft.com/office/powerpoint/2010/main" Requires="p14">
+      <p:transition spd="slow" p14:dur="1200"/>
+    </mc:Choice>
+    <mc:Fallback>
+      <p:transition spd="slow"/>
+    </mc:Fallback>
+  </mc:AlternateContent>
+</p:sld>
+</file>
+
+<file path=ppt/slides/slide11.xml><?xml version="1.0" encoding="utf-8"?>
+<p:sld xmlns:a="http://schemas.openxmlformats.org/drawingml/2006/main" xmlns:r="http://schemas.openxmlformats.org/officeDocument/2006/relationships" xmlns:p="http://schemas.openxmlformats.org/presentationml/2006/main">
+  <p:cSld>
+    <p:spTree>
+      <p:nvGrpSpPr>
+        <p:cNvPr id="1" name=""/>
+        <p:cNvGrpSpPr/>
+        <p:nvPr/>
+      </p:nvGrpSpPr>
+      <p:grpSpPr>
+        <a:xfrm>
+          <a:off x="0" y="0"/>
+          <a:ext cx="0" cy="0"/>
+          <a:chOff x="0" y="0"/>
+          <a:chExt cx="0" cy="0"/>
+        </a:xfrm>
+      </p:grpSpPr>
+      <p:sp>
+        <p:nvSpPr>
+          <p:cNvPr id="2" name="Title 1"/>
+          <p:cNvSpPr>
+            <a:spLocks noGrp="1"/>
+          </p:cNvSpPr>
+          <p:nvPr>
+            <p:ph type="title"/>
+          </p:nvPr>
+        </p:nvSpPr>
+        <p:spPr/>
+        <p:txBody>
+          <a:bodyPr/>
+          <a:lstStyle/>
+          <a:p>
+            <a:pPr algn="l"/>
+            <a:r>
+              <a:rPr lang="en-US" altLang="ug-CN" dirty="0">
+                <a:effectLst/>
+                <a:latin typeface="Ubuntu" panose="020B0504030602030204" charset="0"/>
+                <a:cs typeface="Ubuntu" panose="020B0504030602030204" charset="0"/>
+              </a:rPr>
+              <a:t>References</a:t>
+            </a:r>
+          </a:p>
+        </p:txBody>
+      </p:sp>
+      <p:sp>
+        <p:nvSpPr>
+          <p:cNvPr id="3" name="Content Placeholder 2"/>
+          <p:cNvSpPr>
+            <a:spLocks noGrp="1"/>
+          </p:cNvSpPr>
+          <p:nvPr>
+            <p:ph idx="1"/>
+          </p:nvPr>
+        </p:nvSpPr>
+        <p:spPr/>
+        <p:txBody>
+          <a:bodyPr/>
+          <a:lstStyle/>
+          <a:p>
+            <a:r>
+              <a:rPr lang="en-US" sz="2400" dirty="0">
+                <a:solidFill>
+                  <a:schemeClr val="tx1"/>
+                </a:solidFill>
+                <a:latin typeface="Ubuntu" panose="020B0504030602030204" charset="0"/>
+                <a:cs typeface="Ubuntu" panose="020B0504030602030204" charset="0"/>
+                <a:hlinkClick r:id="rId2"/>
+              </a:rPr>
+              <a:t>https://medium.com/ml-research-lab/machine-learning-algorithm-overview-5816a2e6303</a:t>
+            </a:r>
+            <a:r>
+              <a:rPr lang="en-US" sz="2400" dirty="0">
+                <a:solidFill>
+                  <a:schemeClr val="tx1"/>
+                </a:solidFill>
+                <a:latin typeface="Ubuntu" panose="020B0504030602030204" charset="0"/>
+                <a:cs typeface="Ubuntu" panose="020B0504030602030204" charset="0"/>
+              </a:rPr>
+              <a:t> </a:t>
+            </a:r>
+            <a:endParaRPr lang="en-US" sz="2400" dirty="0">
+              <a:latin typeface="Ubuntu" panose="020B0504030602030204" charset="0"/>
+              <a:cs typeface="Ubuntu" panose="020B0504030602030204" charset="0"/>
+            </a:endParaRPr>
+          </a:p>
+          <a:p>
+            <a:r>
+              <a:rPr lang="en-US" sz="2400" dirty="0">
+                <a:solidFill>
+                  <a:schemeClr val="tx1"/>
+                </a:solidFill>
+                <a:latin typeface="Ubuntu" panose="020B0504030602030204" charset="0"/>
+                <a:cs typeface="Ubuntu" panose="020B0504030602030204" charset="0"/>
+                <a:hlinkClick r:id="rId3"/>
+              </a:rPr>
+              <a:t>https://www.anandtech.com/show/12673/titan-v-deep-learning-deep-dive/2</a:t>
+            </a:r>
+            <a:endParaRPr lang="en-US" sz="2400" dirty="0">
+              <a:solidFill>
+                <a:schemeClr val="tx1"/>
+              </a:solidFill>
+              <a:latin typeface="Ubuntu" panose="020B0504030602030204" charset="0"/>
+              <a:cs typeface="Ubuntu" panose="020B0504030602030204" charset="0"/>
+            </a:endParaRPr>
+          </a:p>
+          <a:p>
+            <a:endParaRPr lang="en-US" sz="2400" dirty="0">
+              <a:solidFill>
+                <a:schemeClr val="tx1"/>
+              </a:solidFill>
+              <a:latin typeface="Ubuntu" panose="020B0504030602030204" charset="0"/>
+              <a:cs typeface="Ubuntu" panose="020B0504030602030204" charset="0"/>
+            </a:endParaRPr>
+          </a:p>
+        </p:txBody>
+      </p:sp>
+    </p:spTree>
+    <p:extLst>
+      <p:ext uri="{BB962C8B-B14F-4D97-AF65-F5344CB8AC3E}">
+        <p14:creationId xmlns:p14="http://schemas.microsoft.com/office/powerpoint/2010/main" val="1604689720"/>
+      </p:ext>
+    </p:extLst>
+  </p:cSld>
+  <p:clrMapOvr>
+    <a:masterClrMapping/>
+  </p:clrMapOvr>
+</p:sld>
+</file>
+
+<file path=ppt/slides/slide12.xml><?xml version="1.0" encoding="utf-8"?>
+<p:sld xmlns:a="http://schemas.openxmlformats.org/drawingml/2006/main" xmlns:r="http://schemas.openxmlformats.org/officeDocument/2006/relationships" xmlns:p="http://schemas.openxmlformats.org/presentationml/2006/main">
+  <p:cSld>
+    <p:spTree>
+      <p:nvGrpSpPr>
+        <p:cNvPr id="1" name=""/>
+        <p:cNvGrpSpPr/>
+        <p:nvPr/>
+      </p:nvGrpSpPr>
+      <p:grpSpPr>
+        <a:xfrm>
+          <a:off x="0" y="0"/>
+          <a:ext cx="0" cy="0"/>
+          <a:chOff x="0" y="0"/>
+          <a:chExt cx="0" cy="0"/>
+        </a:xfrm>
+      </p:grpSpPr>
+      <p:sp>
+        <p:nvSpPr>
+          <p:cNvPr id="2" name="Title 1"/>
+          <p:cNvSpPr>
+            <a:spLocks noGrp="1"/>
+          </p:cNvSpPr>
+          <p:nvPr>
+            <p:ph type="title"/>
+          </p:nvPr>
+        </p:nvSpPr>
         <p:spPr>
           <a:xfrm>
             <a:off x="609600" y="1556385"/>
@@ -4604,6 +4956,19 @@
               <a:t>ML Algorithms Overview</a:t>
             </a:r>
           </a:p>
+          <a:p>
+            <a:pPr marL="457200" indent="-457200" algn="l">
+              <a:buFont typeface="+mj-lt"/>
+              <a:buAutoNum type="arabicPeriod"/>
+            </a:pPr>
+            <a:r>
+              <a:rPr lang="en-US" altLang="ar-EG" sz="2400" dirty="0">
+                <a:latin typeface="Ubuntu" panose="020B0504030602030204" charset="0"/>
+                <a:cs typeface="Ubuntu" panose="020B0504030602030204" charset="0"/>
+              </a:rPr>
+              <a:t>Performance Measure</a:t>
+            </a:r>
+          </a:p>
         </p:txBody>
       </p:sp>
     </p:spTree>
@@ -4700,7 +5065,10 @@
             <a:r>
               <a:rPr lang="en-US" altLang="ar-EG" sz="2400" dirty="0">
                 <a:solidFill>
-                  <a:schemeClr val="bg2"/>
+                  <a:schemeClr val="bg2">
+                    <a:lumMod val="60000"/>
+                    <a:lumOff val="40000"/>
+                  </a:schemeClr>
                 </a:solidFill>
                 <a:latin typeface="Ubuntu" panose="020B0504030602030204" charset="0"/>
                 <a:cs typeface="Ubuntu" panose="020B0504030602030204" charset="0"/>
@@ -4708,12 +5076,31 @@
               <a:t>ML Algorithms Overview</a:t>
             </a:r>
           </a:p>
+          <a:p>
+            <a:pPr marL="457200" indent="-457200" algn="l">
+              <a:buFont typeface="+mj-lt"/>
+              <a:buAutoNum type="arabicPeriod"/>
+            </a:pPr>
+            <a:r>
+              <a:rPr lang="en-US" altLang="ar-EG" sz="2400" dirty="0">
+                <a:solidFill>
+                  <a:schemeClr val="bg2">
+                    <a:lumMod val="60000"/>
+                    <a:lumOff val="40000"/>
+                  </a:schemeClr>
+                </a:solidFill>
+                <a:latin typeface="Ubuntu" panose="020B0504030602030204" charset="0"/>
+                <a:cs typeface="Ubuntu" panose="020B0504030602030204" charset="0"/>
+              </a:rPr>
+              <a:t>Performance Measure</a:t>
+            </a:r>
+          </a:p>
         </p:txBody>
       </p:sp>
     </p:spTree>
     <p:extLst>
       <p:ext uri="{BB962C8B-B14F-4D97-AF65-F5344CB8AC3E}">
-        <p14:creationId xmlns:p14="http://schemas.microsoft.com/office/powerpoint/2010/main" val="3908915174"/>
+        <p14:creationId xmlns:p14="http://schemas.microsoft.com/office/powerpoint/2010/main" val="1224925125"/>
       </p:ext>
     </p:extLst>
   </p:cSld>
@@ -4929,7 +5316,10 @@
             <a:r>
               <a:rPr lang="en-US" altLang="ar-EG" sz="2400" dirty="0">
                 <a:solidFill>
-                  <a:schemeClr val="bg2"/>
+                  <a:schemeClr val="bg2">
+                    <a:lumMod val="60000"/>
+                    <a:lumOff val="40000"/>
+                  </a:schemeClr>
                 </a:solidFill>
                 <a:latin typeface="Ubuntu" panose="020B0504030602030204" charset="0"/>
                 <a:cs typeface="Ubuntu" panose="020B0504030602030204" charset="0"/>
@@ -4950,12 +5340,31 @@
               <a:t>ML Algorithms Overview</a:t>
             </a:r>
           </a:p>
+          <a:p>
+            <a:pPr marL="457200" indent="-457200" algn="l">
+              <a:buFont typeface="+mj-lt"/>
+              <a:buAutoNum type="arabicPeriod"/>
+            </a:pPr>
+            <a:r>
+              <a:rPr lang="en-US" altLang="ar-EG" sz="2400" dirty="0">
+                <a:solidFill>
+                  <a:schemeClr val="bg2">
+                    <a:lumMod val="60000"/>
+                    <a:lumOff val="40000"/>
+                  </a:schemeClr>
+                </a:solidFill>
+                <a:latin typeface="Ubuntu" panose="020B0504030602030204" charset="0"/>
+                <a:cs typeface="Ubuntu" panose="020B0504030602030204" charset="0"/>
+              </a:rPr>
+              <a:t>Performance Measure</a:t>
+            </a:r>
+          </a:p>
         </p:txBody>
       </p:sp>
     </p:spTree>
     <p:extLst>
       <p:ext uri="{BB962C8B-B14F-4D97-AF65-F5344CB8AC3E}">
-        <p14:creationId xmlns:p14="http://schemas.microsoft.com/office/powerpoint/2010/main" val="3437236140"/>
+        <p14:creationId xmlns:p14="http://schemas.microsoft.com/office/powerpoint/2010/main" val="2655343668"/>
       </p:ext>
     </p:extLst>
   </p:cSld>
@@ -7250,11 +7659,11 @@
   <p:clrMapOvr>
     <a:masterClrMapping/>
   </p:clrMapOvr>
-  <mc:AlternateContent xmlns:mc="http://schemas.openxmlformats.org/markup-compatibility/2006">
-    <mc:Choice xmlns:p14="http://schemas.microsoft.com/office/powerpoint/2010/main" Requires="p14">
+  <mc:AlternateContent xmlns:mc="http://schemas.openxmlformats.org/markup-compatibility/2006" xmlns:p14="http://schemas.microsoft.com/office/powerpoint/2010/main">
+    <mc:Choice Requires="p14">
       <p:transition spd="slow" p14:dur="1200"/>
     </mc:Choice>
-    <mc:Fallback>
+    <mc:Fallback xmlns="">
       <p:transition spd="slow"/>
     </mc:Fallback>
   </mc:AlternateContent>
@@ -7295,12 +7704,11 @@
           <a:p>
             <a:pPr algn="l"/>
             <a:r>
-              <a:rPr lang="en-US" altLang="ug-CN" dirty="0">
-                <a:effectLst/>
+              <a:rPr lang="en-US" dirty="0">
                 <a:latin typeface="Ubuntu" panose="020B0504030602030204" charset="0"/>
                 <a:cs typeface="Ubuntu" panose="020B0504030602030204" charset="0"/>
               </a:rPr>
-              <a:t>References</a:t>
+              <a:t>Outline</a:t>
             </a:r>
           </a:p>
         </p:txBody>
@@ -7320,73 +7728,76 @@
           <a:bodyPr/>
           <a:lstStyle/>
           <a:p>
-            <a:r>
-              <a:rPr lang="en-US" sz="2400" dirty="0">
+            <a:pPr marL="457200" indent="-457200" algn="l">
+              <a:buFont typeface="+mj-lt"/>
+              <a:buAutoNum type="arabicPeriod"/>
+            </a:pPr>
+            <a:r>
+              <a:rPr lang="en-US" altLang="ar-EG" sz="2400" dirty="0">
                 <a:solidFill>
-                  <a:schemeClr val="tx1"/>
-                </a:solidFill>
-                <a:latin typeface="Ubuntu" panose="020B0504030602030204" charset="0"/>
-                <a:cs typeface="Ubuntu" panose="020B0504030602030204" charset="0"/>
-                <a:hlinkClick r:id="rId2"/>
-              </a:rPr>
-              <a:t>https://medium.com/ml-research-lab/machine-learning-algorithm-overview-5816a2e6303</a:t>
-            </a:r>
-            <a:r>
-              <a:rPr lang="en-US" sz="2400" dirty="0">
-                <a:solidFill>
-                  <a:schemeClr val="tx1"/>
+                  <a:schemeClr val="bg2">
+                    <a:lumMod val="60000"/>
+                    <a:lumOff val="40000"/>
+                  </a:schemeClr>
                 </a:solidFill>
                 <a:latin typeface="Ubuntu" panose="020B0504030602030204" charset="0"/>
                 <a:cs typeface="Ubuntu" panose="020B0504030602030204" charset="0"/>
               </a:rPr>
-              <a:t> </a:t>
-            </a:r>
-            <a:endParaRPr lang="en-US" sz="2400" dirty="0">
-              <a:latin typeface="Ubuntu" panose="020B0504030602030204" charset="0"/>
-              <a:cs typeface="Ubuntu" panose="020B0504030602030204" charset="0"/>
-            </a:endParaRPr>
-          </a:p>
-          <a:p>
-            <a:r>
-              <a:rPr lang="en-US" sz="2400" dirty="0">
+              <a:t>What is Machine Learning</a:t>
+            </a:r>
+          </a:p>
+          <a:p>
+            <a:pPr marL="457200" indent="-457200" algn="l">
+              <a:buFont typeface="+mj-lt"/>
+              <a:buAutoNum type="arabicPeriod"/>
+            </a:pPr>
+            <a:r>
+              <a:rPr lang="en-US" altLang="ar-EG" sz="2400" dirty="0">
                 <a:solidFill>
-                  <a:schemeClr val="tx1"/>
+                  <a:schemeClr val="bg2">
+                    <a:lumMod val="60000"/>
+                    <a:lumOff val="40000"/>
+                  </a:schemeClr>
                 </a:solidFill>
                 <a:latin typeface="Ubuntu" panose="020B0504030602030204" charset="0"/>
                 <a:cs typeface="Ubuntu" panose="020B0504030602030204" charset="0"/>
-                <a:hlinkClick r:id="rId3"/>
               </a:rPr>
-              <a:t>https://www.anandtech.com/show/12673/titan-v-deep-learning-deep-dive/2</a:t>
-            </a:r>
-            <a:endParaRPr lang="en-US" sz="2400" dirty="0">
-              <a:solidFill>
-                <a:schemeClr val="tx1"/>
-              </a:solidFill>
-              <a:latin typeface="Ubuntu" panose="020B0504030602030204" charset="0"/>
-              <a:cs typeface="Ubuntu" panose="020B0504030602030204" charset="0"/>
-            </a:endParaRPr>
-          </a:p>
-          <a:p>
-            <a:endParaRPr lang="en-US" sz="2400" dirty="0">
-              <a:solidFill>
-                <a:schemeClr val="tx1"/>
-              </a:solidFill>
-              <a:latin typeface="Ubuntu" panose="020B0504030602030204" charset="0"/>
-              <a:cs typeface="Ubuntu" panose="020B0504030602030204" charset="0"/>
-            </a:endParaRPr>
+              <a:t>ML Algorithms Overview</a:t>
+            </a:r>
+          </a:p>
+          <a:p>
+            <a:pPr marL="457200" indent="-457200" algn="l">
+              <a:buFont typeface="+mj-lt"/>
+              <a:buAutoNum type="arabicPeriod"/>
+            </a:pPr>
+            <a:r>
+              <a:rPr lang="en-US" altLang="ar-EG" sz="2400" dirty="0">
+                <a:latin typeface="Ubuntu" panose="020B0504030602030204" charset="0"/>
+                <a:cs typeface="Ubuntu" panose="020B0504030602030204" charset="0"/>
+              </a:rPr>
+              <a:t>Performance Measure</a:t>
+            </a:r>
           </a:p>
         </p:txBody>
       </p:sp>
     </p:spTree>
     <p:extLst>
       <p:ext uri="{BB962C8B-B14F-4D97-AF65-F5344CB8AC3E}">
-        <p14:creationId xmlns:p14="http://schemas.microsoft.com/office/powerpoint/2010/main" val="1604689720"/>
+        <p14:creationId xmlns:p14="http://schemas.microsoft.com/office/powerpoint/2010/main" val="3475381099"/>
       </p:ext>
     </p:extLst>
   </p:cSld>
   <p:clrMapOvr>
     <a:masterClrMapping/>
   </p:clrMapOvr>
+  <mc:AlternateContent xmlns:mc="http://schemas.openxmlformats.org/markup-compatibility/2006" xmlns:p14="http://schemas.microsoft.com/office/powerpoint/2010/main">
+    <mc:Choice Requires="p14">
+      <p:transition spd="slow" p14:dur="1200"/>
+    </mc:Choice>
+    <mc:Fallback xmlns="">
+      <p:transition spd="slow"/>
+    </mc:Fallback>
+  </mc:AlternateContent>
 </p:sld>
 </file>
 

</xml_diff>

<commit_message>
add evaluation metrics to the slides
</commit_message>
<xml_diff>
--- a/slides/Session 07 - Machine Learning Overview.pptx
+++ b/slides/Session 07 - Machine Learning Overview.pptx
@@ -5,24 +5,27 @@
     <p:sldMasterId id="2147483648" r:id="rId1"/>
   </p:sldMasterIdLst>
   <p:notesMasterIdLst>
-    <p:notesMasterId r:id="rId14"/>
+    <p:notesMasterId r:id="rId17"/>
   </p:notesMasterIdLst>
   <p:handoutMasterIdLst>
-    <p:handoutMasterId r:id="rId15"/>
+    <p:handoutMasterId r:id="rId18"/>
   </p:handoutMasterIdLst>
   <p:sldIdLst>
     <p:sldId id="256" r:id="rId2"/>
     <p:sldId id="258" r:id="rId3"/>
     <p:sldId id="362" r:id="rId4"/>
-    <p:sldId id="367" r:id="rId5"/>
+    <p:sldId id="369" r:id="rId5"/>
     <p:sldId id="363" r:id="rId6"/>
-    <p:sldId id="368" r:id="rId7"/>
+    <p:sldId id="370" r:id="rId7"/>
     <p:sldId id="259" r:id="rId8"/>
     <p:sldId id="364" r:id="rId9"/>
-    <p:sldId id="369" r:id="rId10"/>
+    <p:sldId id="371" r:id="rId10"/>
     <p:sldId id="366" r:id="rId11"/>
-    <p:sldId id="365" r:id="rId12"/>
-    <p:sldId id="270" r:id="rId13"/>
+    <p:sldId id="372" r:id="rId12"/>
+    <p:sldId id="367" r:id="rId13"/>
+    <p:sldId id="368" r:id="rId14"/>
+    <p:sldId id="365" r:id="rId15"/>
+    <p:sldId id="270" r:id="rId16"/>
   </p:sldIdLst>
   <p:sldSz cx="12192000" cy="6858000"/>
   <p:notesSz cx="7104063" cy="10234613"/>
@@ -762,7 +765,7 @@
     </p:spTree>
     <p:extLst>
       <p:ext uri="{BB962C8B-B14F-4D97-AF65-F5344CB8AC3E}">
-        <p14:creationId xmlns:p14="http://schemas.microsoft.com/office/powerpoint/2010/main" val="2675520828"/>
+        <p14:creationId xmlns:p14="http://schemas.microsoft.com/office/powerpoint/2010/main" val="1635481562"/>
       </p:ext>
     </p:extLst>
   </p:cSld>
@@ -823,7 +826,7 @@
     </p:spTree>
     <p:extLst>
       <p:ext uri="{BB962C8B-B14F-4D97-AF65-F5344CB8AC3E}">
-        <p14:creationId xmlns:p14="http://schemas.microsoft.com/office/powerpoint/2010/main" val="2562151963"/>
+        <p14:creationId xmlns:p14="http://schemas.microsoft.com/office/powerpoint/2010/main" val="3434923729"/>
       </p:ext>
     </p:extLst>
   </p:cSld>
@@ -945,7 +948,7 @@
     </p:spTree>
     <p:extLst>
       <p:ext uri="{BB962C8B-B14F-4D97-AF65-F5344CB8AC3E}">
-        <p14:creationId xmlns:p14="http://schemas.microsoft.com/office/powerpoint/2010/main" val="2017836680"/>
+        <p14:creationId xmlns:p14="http://schemas.microsoft.com/office/powerpoint/2010/main" val="93485618"/>
       </p:ext>
     </p:extLst>
   </p:cSld>
@@ -1007,6 +1010,189 @@
     <p:extLst>
       <p:ext uri="{BB962C8B-B14F-4D97-AF65-F5344CB8AC3E}">
         <p14:creationId xmlns:p14="http://schemas.microsoft.com/office/powerpoint/2010/main" val="2708130100"/>
+      </p:ext>
+    </p:extLst>
+  </p:cSld>
+  <p:clrMapOvr>
+    <a:masterClrMapping/>
+  </p:clrMapOvr>
+</p:notes>
+</file>
+
+<file path=ppt/notesSlides/notesSlide7.xml><?xml version="1.0" encoding="utf-8"?>
+<p:notes xmlns:a="http://schemas.openxmlformats.org/drawingml/2006/main" xmlns:r="http://schemas.openxmlformats.org/officeDocument/2006/relationships" xmlns:p="http://schemas.openxmlformats.org/presentationml/2006/main">
+  <p:cSld>
+    <p:spTree>
+      <p:nvGrpSpPr>
+        <p:cNvPr id="1" name=""/>
+        <p:cNvGrpSpPr/>
+        <p:nvPr/>
+      </p:nvGrpSpPr>
+      <p:grpSpPr>
+        <a:xfrm>
+          <a:off x="0" y="0"/>
+          <a:ext cx="0" cy="0"/>
+          <a:chOff x="0" y="0"/>
+          <a:chExt cx="0" cy="0"/>
+        </a:xfrm>
+      </p:grpSpPr>
+      <p:sp>
+        <p:nvSpPr>
+          <p:cNvPr id="2" name="Slide Image Placeholder 1"/>
+          <p:cNvSpPr>
+            <a:spLocks noGrp="1" noRot="1" noChangeAspect="1"/>
+          </p:cNvSpPr>
+          <p:nvPr>
+            <p:ph type="sldImg" idx="2"/>
+          </p:nvPr>
+        </p:nvSpPr>
+        <p:spPr/>
+      </p:sp>
+      <p:sp>
+        <p:nvSpPr>
+          <p:cNvPr id="3" name="Text Placeholder 2"/>
+          <p:cNvSpPr>
+            <a:spLocks noGrp="1"/>
+          </p:cNvSpPr>
+          <p:nvPr>
+            <p:ph type="body" idx="3"/>
+          </p:nvPr>
+        </p:nvSpPr>
+        <p:spPr/>
+        <p:txBody>
+          <a:bodyPr/>
+          <a:lstStyle/>
+          <a:p>
+            <a:endParaRPr lang="en-US" dirty="0"/>
+          </a:p>
+        </p:txBody>
+      </p:sp>
+    </p:spTree>
+    <p:extLst>
+      <p:ext uri="{BB962C8B-B14F-4D97-AF65-F5344CB8AC3E}">
+        <p14:creationId xmlns:p14="http://schemas.microsoft.com/office/powerpoint/2010/main" val="3885294232"/>
+      </p:ext>
+    </p:extLst>
+  </p:cSld>
+  <p:clrMapOvr>
+    <a:masterClrMapping/>
+  </p:clrMapOvr>
+</p:notes>
+</file>
+
+<file path=ppt/notesSlides/notesSlide8.xml><?xml version="1.0" encoding="utf-8"?>
+<p:notes xmlns:a="http://schemas.openxmlformats.org/drawingml/2006/main" xmlns:r="http://schemas.openxmlformats.org/officeDocument/2006/relationships" xmlns:p="http://schemas.openxmlformats.org/presentationml/2006/main">
+  <p:cSld>
+    <p:spTree>
+      <p:nvGrpSpPr>
+        <p:cNvPr id="1" name=""/>
+        <p:cNvGrpSpPr/>
+        <p:nvPr/>
+      </p:nvGrpSpPr>
+      <p:grpSpPr>
+        <a:xfrm>
+          <a:off x="0" y="0"/>
+          <a:ext cx="0" cy="0"/>
+          <a:chOff x="0" y="0"/>
+          <a:chExt cx="0" cy="0"/>
+        </a:xfrm>
+      </p:grpSpPr>
+      <p:sp>
+        <p:nvSpPr>
+          <p:cNvPr id="2" name="Slide Image Placeholder 1"/>
+          <p:cNvSpPr>
+            <a:spLocks noGrp="1" noRot="1" noChangeAspect="1"/>
+          </p:cNvSpPr>
+          <p:nvPr>
+            <p:ph type="sldImg" idx="2"/>
+          </p:nvPr>
+        </p:nvSpPr>
+        <p:spPr/>
+      </p:sp>
+      <p:sp>
+        <p:nvSpPr>
+          <p:cNvPr id="3" name="Text Placeholder 2"/>
+          <p:cNvSpPr>
+            <a:spLocks noGrp="1"/>
+          </p:cNvSpPr>
+          <p:nvPr>
+            <p:ph type="body" idx="3"/>
+          </p:nvPr>
+        </p:nvSpPr>
+        <p:spPr/>
+        <p:txBody>
+          <a:bodyPr/>
+          <a:lstStyle/>
+          <a:p>
+            <a:endParaRPr lang="en-US" dirty="0"/>
+          </a:p>
+        </p:txBody>
+      </p:sp>
+    </p:spTree>
+    <p:extLst>
+      <p:ext uri="{BB962C8B-B14F-4D97-AF65-F5344CB8AC3E}">
+        <p14:creationId xmlns:p14="http://schemas.microsoft.com/office/powerpoint/2010/main" val="4187477730"/>
+      </p:ext>
+    </p:extLst>
+  </p:cSld>
+  <p:clrMapOvr>
+    <a:masterClrMapping/>
+  </p:clrMapOvr>
+</p:notes>
+</file>
+
+<file path=ppt/notesSlides/notesSlide9.xml><?xml version="1.0" encoding="utf-8"?>
+<p:notes xmlns:a="http://schemas.openxmlformats.org/drawingml/2006/main" xmlns:r="http://schemas.openxmlformats.org/officeDocument/2006/relationships" xmlns:p="http://schemas.openxmlformats.org/presentationml/2006/main">
+  <p:cSld>
+    <p:spTree>
+      <p:nvGrpSpPr>
+        <p:cNvPr id="1" name=""/>
+        <p:cNvGrpSpPr/>
+        <p:nvPr/>
+      </p:nvGrpSpPr>
+      <p:grpSpPr>
+        <a:xfrm>
+          <a:off x="0" y="0"/>
+          <a:ext cx="0" cy="0"/>
+          <a:chOff x="0" y="0"/>
+          <a:chExt cx="0" cy="0"/>
+        </a:xfrm>
+      </p:grpSpPr>
+      <p:sp>
+        <p:nvSpPr>
+          <p:cNvPr id="2" name="Slide Image Placeholder 1"/>
+          <p:cNvSpPr>
+            <a:spLocks noGrp="1" noRot="1" noChangeAspect="1"/>
+          </p:cNvSpPr>
+          <p:nvPr>
+            <p:ph type="sldImg" idx="2"/>
+          </p:nvPr>
+        </p:nvSpPr>
+        <p:spPr/>
+      </p:sp>
+      <p:sp>
+        <p:nvSpPr>
+          <p:cNvPr id="3" name="Text Placeholder 2"/>
+          <p:cNvSpPr>
+            <a:spLocks noGrp="1"/>
+          </p:cNvSpPr>
+          <p:nvPr>
+            <p:ph type="body" idx="3"/>
+          </p:nvPr>
+        </p:nvSpPr>
+        <p:spPr/>
+        <p:txBody>
+          <a:bodyPr/>
+          <a:lstStyle/>
+          <a:p>
+            <a:endParaRPr lang="en-US" dirty="0"/>
+          </a:p>
+        </p:txBody>
+      </p:sp>
+    </p:spTree>
+    <p:extLst>
+      <p:ext uri="{BB962C8B-B14F-4D97-AF65-F5344CB8AC3E}">
+        <p14:creationId xmlns:p14="http://schemas.microsoft.com/office/powerpoint/2010/main" val="3050614548"/>
       </p:ext>
     </p:extLst>
   </p:cSld>
@@ -4538,11 +4724,11 @@
   <p:clrMapOvr>
     <a:masterClrMapping/>
   </p:clrMapOvr>
-  <mc:AlternateContent xmlns:mc="http://schemas.openxmlformats.org/markup-compatibility/2006">
-    <mc:Choice xmlns:p14="http://schemas.microsoft.com/office/powerpoint/2010/main" Requires="p14">
+  <mc:AlternateContent xmlns:mc="http://schemas.openxmlformats.org/markup-compatibility/2006" xmlns:p14="http://schemas.microsoft.com/office/powerpoint/2010/main">
+    <mc:Choice Requires="p14">
       <p:transition spd="slow" p14:dur="1200"/>
     </mc:Choice>
-    <mc:Fallback>
+    <mc:Fallback xmlns="">
       <p:transition spd="slow"/>
     </mc:Fallback>
   </mc:AlternateContent>
@@ -4583,6 +4769,372 @@
           <a:p>
             <a:pPr algn="l"/>
             <a:r>
+              <a:rPr lang="en-US" dirty="0">
+                <a:latin typeface="Ubuntu" panose="020B0504030602030204" charset="0"/>
+                <a:cs typeface="Ubuntu" panose="020B0504030602030204" charset="0"/>
+              </a:rPr>
+              <a:t>Outline</a:t>
+            </a:r>
+          </a:p>
+        </p:txBody>
+      </p:sp>
+      <p:sp>
+        <p:nvSpPr>
+          <p:cNvPr id="3" name="Content Placeholder 2"/>
+          <p:cNvSpPr>
+            <a:spLocks noGrp="1"/>
+          </p:cNvSpPr>
+          <p:nvPr>
+            <p:ph idx="1"/>
+          </p:nvPr>
+        </p:nvSpPr>
+        <p:spPr/>
+        <p:txBody>
+          <a:bodyPr/>
+          <a:lstStyle/>
+          <a:p>
+            <a:pPr marL="457200" indent="-457200" algn="l">
+              <a:buFont typeface="+mj-lt"/>
+              <a:buAutoNum type="arabicPeriod"/>
+            </a:pPr>
+            <a:r>
+              <a:rPr lang="en-US" altLang="ar-EG" sz="2400" dirty="0">
+                <a:solidFill>
+                  <a:schemeClr val="bg2">
+                    <a:lumMod val="40000"/>
+                    <a:lumOff val="60000"/>
+                  </a:schemeClr>
+                </a:solidFill>
+                <a:latin typeface="Ubuntu" panose="020B0504030602030204" charset="0"/>
+                <a:cs typeface="Ubuntu" panose="020B0504030602030204" charset="0"/>
+              </a:rPr>
+              <a:t>What is Machine Learning</a:t>
+            </a:r>
+          </a:p>
+          <a:p>
+            <a:pPr marL="457200" indent="-457200" algn="l">
+              <a:buFont typeface="+mj-lt"/>
+              <a:buAutoNum type="arabicPeriod"/>
+            </a:pPr>
+            <a:r>
+              <a:rPr lang="en-US" altLang="ar-EG" sz="2400" dirty="0">
+                <a:solidFill>
+                  <a:schemeClr val="bg2">
+                    <a:lumMod val="40000"/>
+                    <a:lumOff val="60000"/>
+                  </a:schemeClr>
+                </a:solidFill>
+                <a:latin typeface="Ubuntu" panose="020B0504030602030204" charset="0"/>
+                <a:cs typeface="Ubuntu" panose="020B0504030602030204" charset="0"/>
+              </a:rPr>
+              <a:t>ML Algorithms Overview</a:t>
+            </a:r>
+          </a:p>
+          <a:p>
+            <a:pPr marL="457200" indent="-457200" algn="l">
+              <a:buFont typeface="+mj-lt"/>
+              <a:buAutoNum type="arabicPeriod"/>
+            </a:pPr>
+            <a:r>
+              <a:rPr lang="en-US" altLang="ar-EG" sz="2400" dirty="0">
+                <a:solidFill>
+                  <a:schemeClr val="bg2">
+                    <a:lumMod val="40000"/>
+                    <a:lumOff val="60000"/>
+                  </a:schemeClr>
+                </a:solidFill>
+                <a:latin typeface="Ubuntu" panose="020B0504030602030204" charset="0"/>
+                <a:cs typeface="Ubuntu" panose="020B0504030602030204" charset="0"/>
+              </a:rPr>
+              <a:t>Confusion Matrix</a:t>
+            </a:r>
+          </a:p>
+          <a:p>
+            <a:pPr marL="457200" indent="-457200" algn="l">
+              <a:buFont typeface="+mj-lt"/>
+              <a:buAutoNum type="arabicPeriod"/>
+            </a:pPr>
+            <a:r>
+              <a:rPr lang="en-US" altLang="ar-EG" sz="2400" dirty="0">
+                <a:latin typeface="Ubuntu" panose="020B0504030602030204" charset="0"/>
+                <a:cs typeface="Ubuntu" panose="020B0504030602030204" charset="0"/>
+              </a:rPr>
+              <a:t>Evaluation Metrics</a:t>
+            </a:r>
+          </a:p>
+        </p:txBody>
+      </p:sp>
+    </p:spTree>
+    <p:extLst>
+      <p:ext uri="{BB962C8B-B14F-4D97-AF65-F5344CB8AC3E}">
+        <p14:creationId xmlns:p14="http://schemas.microsoft.com/office/powerpoint/2010/main" val="962634313"/>
+      </p:ext>
+    </p:extLst>
+  </p:cSld>
+  <p:clrMapOvr>
+    <a:masterClrMapping/>
+  </p:clrMapOvr>
+  <mc:AlternateContent xmlns:mc="http://schemas.openxmlformats.org/markup-compatibility/2006" xmlns:p14="http://schemas.microsoft.com/office/powerpoint/2010/main">
+    <mc:Choice Requires="p14">
+      <p:transition spd="slow" p14:dur="1200"/>
+    </mc:Choice>
+    <mc:Fallback xmlns="">
+      <p:transition spd="slow"/>
+    </mc:Fallback>
+  </mc:AlternateContent>
+</p:sld>
+</file>
+
+<file path=ppt/slides/slide12.xml><?xml version="1.0" encoding="utf-8"?>
+<p:sld xmlns:a="http://schemas.openxmlformats.org/drawingml/2006/main" xmlns:r="http://schemas.openxmlformats.org/officeDocument/2006/relationships" xmlns:p="http://schemas.openxmlformats.org/presentationml/2006/main">
+  <p:cSld>
+    <p:spTree>
+      <p:nvGrpSpPr>
+        <p:cNvPr id="1" name=""/>
+        <p:cNvGrpSpPr/>
+        <p:nvPr/>
+      </p:nvGrpSpPr>
+      <p:grpSpPr>
+        <a:xfrm>
+          <a:off x="0" y="0"/>
+          <a:ext cx="0" cy="0"/>
+          <a:chOff x="0" y="0"/>
+          <a:chExt cx="0" cy="0"/>
+        </a:xfrm>
+      </p:grpSpPr>
+      <p:sp>
+        <p:nvSpPr>
+          <p:cNvPr id="2" name="Title 1"/>
+          <p:cNvSpPr>
+            <a:spLocks noGrp="1"/>
+          </p:cNvSpPr>
+          <p:nvPr>
+            <p:ph type="title"/>
+          </p:nvPr>
+        </p:nvSpPr>
+        <p:spPr/>
+        <p:txBody>
+          <a:bodyPr/>
+          <a:lstStyle/>
+          <a:p>
+            <a:pPr algn="l"/>
+            <a:r>
+              <a:rPr lang="en-US" dirty="0">
+                <a:latin typeface="Ubuntu" panose="020B0504030602030204" charset="0"/>
+                <a:cs typeface="Ubuntu" panose="020B0504030602030204" charset="0"/>
+              </a:rPr>
+              <a:t>Evaluation Metrics for Regression</a:t>
+            </a:r>
+          </a:p>
+        </p:txBody>
+      </p:sp>
+      <p:pic>
+        <p:nvPicPr>
+          <p:cNvPr id="13" name="Content Placeholder 12">
+            <a:extLst>
+              <a:ext uri="{FF2B5EF4-FFF2-40B4-BE49-F238E27FC236}">
+                <a16:creationId xmlns:a16="http://schemas.microsoft.com/office/drawing/2014/main" id="{1644DF64-12EC-E1BE-3F40-F6956547151A}"/>
+              </a:ext>
+            </a:extLst>
+          </p:cNvPr>
+          <p:cNvPicPr>
+            <a:picLocks noGrp="1" noChangeAspect="1"/>
+          </p:cNvPicPr>
+          <p:nvPr>
+            <p:ph idx="1"/>
+          </p:nvPr>
+        </p:nvPicPr>
+        <p:blipFill>
+          <a:blip r:embed="rId3"/>
+          <a:stretch>
+            <a:fillRect/>
+          </a:stretch>
+        </p:blipFill>
+        <p:spPr>
+          <a:xfrm>
+            <a:off x="1282327" y="1286131"/>
+            <a:ext cx="9627346" cy="5092277"/>
+          </a:xfrm>
+        </p:spPr>
+      </p:pic>
+      <p:pic>
+        <p:nvPicPr>
+          <p:cNvPr id="15" name="Picture 14">
+            <a:extLst>
+              <a:ext uri="{FF2B5EF4-FFF2-40B4-BE49-F238E27FC236}">
+                <a16:creationId xmlns:a16="http://schemas.microsoft.com/office/drawing/2014/main" id="{234CC5E3-3ECD-7A0D-0416-03A055E15031}"/>
+              </a:ext>
+            </a:extLst>
+          </p:cNvPr>
+          <p:cNvPicPr>
+            <a:picLocks noChangeAspect="1"/>
+          </p:cNvPicPr>
+          <p:nvPr/>
+        </p:nvPicPr>
+        <p:blipFill>
+          <a:blip r:embed="rId4"/>
+          <a:stretch>
+            <a:fillRect/>
+          </a:stretch>
+        </p:blipFill>
+        <p:spPr>
+          <a:xfrm>
+            <a:off x="7601519" y="2077448"/>
+            <a:ext cx="3152918" cy="703366"/>
+          </a:xfrm>
+          <a:prstGeom prst="rect">
+            <a:avLst/>
+          </a:prstGeom>
+        </p:spPr>
+      </p:pic>
+    </p:spTree>
+    <p:extLst>
+      <p:ext uri="{BB962C8B-B14F-4D97-AF65-F5344CB8AC3E}">
+        <p14:creationId xmlns:p14="http://schemas.microsoft.com/office/powerpoint/2010/main" val="3132837416"/>
+      </p:ext>
+    </p:extLst>
+  </p:cSld>
+  <p:clrMapOvr>
+    <a:masterClrMapping/>
+  </p:clrMapOvr>
+  <mc:AlternateContent xmlns:mc="http://schemas.openxmlformats.org/markup-compatibility/2006">
+    <mc:Choice xmlns:p14="http://schemas.microsoft.com/office/powerpoint/2010/main" Requires="p14">
+      <p:transition spd="slow" p14:dur="1200"/>
+    </mc:Choice>
+    <mc:Fallback>
+      <p:transition spd="slow"/>
+    </mc:Fallback>
+  </mc:AlternateContent>
+</p:sld>
+</file>
+
+<file path=ppt/slides/slide13.xml><?xml version="1.0" encoding="utf-8"?>
+<p:sld xmlns:a="http://schemas.openxmlformats.org/drawingml/2006/main" xmlns:r="http://schemas.openxmlformats.org/officeDocument/2006/relationships" xmlns:p="http://schemas.openxmlformats.org/presentationml/2006/main">
+  <p:cSld>
+    <p:spTree>
+      <p:nvGrpSpPr>
+        <p:cNvPr id="1" name=""/>
+        <p:cNvGrpSpPr/>
+        <p:nvPr/>
+      </p:nvGrpSpPr>
+      <p:grpSpPr>
+        <a:xfrm>
+          <a:off x="0" y="0"/>
+          <a:ext cx="0" cy="0"/>
+          <a:chOff x="0" y="0"/>
+          <a:chExt cx="0" cy="0"/>
+        </a:xfrm>
+      </p:grpSpPr>
+      <p:sp>
+        <p:nvSpPr>
+          <p:cNvPr id="2" name="Title 1"/>
+          <p:cNvSpPr>
+            <a:spLocks noGrp="1"/>
+          </p:cNvSpPr>
+          <p:nvPr>
+            <p:ph type="title"/>
+          </p:nvPr>
+        </p:nvSpPr>
+        <p:spPr/>
+        <p:txBody>
+          <a:bodyPr/>
+          <a:lstStyle/>
+          <a:p>
+            <a:pPr algn="l"/>
+            <a:r>
+              <a:rPr lang="en-US" dirty="0">
+                <a:latin typeface="Ubuntu" panose="020B0504030602030204" charset="0"/>
+                <a:cs typeface="Ubuntu" panose="020B0504030602030204" charset="0"/>
+              </a:rPr>
+              <a:t>Evaluation Metrics for Classification</a:t>
+            </a:r>
+          </a:p>
+        </p:txBody>
+      </p:sp>
+      <p:pic>
+        <p:nvPicPr>
+          <p:cNvPr id="6" name="Content Placeholder 5">
+            <a:extLst>
+              <a:ext uri="{FF2B5EF4-FFF2-40B4-BE49-F238E27FC236}">
+                <a16:creationId xmlns:a16="http://schemas.microsoft.com/office/drawing/2014/main" id="{4472DC28-0499-671D-FD42-75C401B10F1D}"/>
+              </a:ext>
+            </a:extLst>
+          </p:cNvPr>
+          <p:cNvPicPr>
+            <a:picLocks noGrp="1" noChangeAspect="1"/>
+          </p:cNvPicPr>
+          <p:nvPr>
+            <p:ph idx="1"/>
+          </p:nvPr>
+        </p:nvPicPr>
+        <p:blipFill>
+          <a:blip r:embed="rId3"/>
+          <a:stretch>
+            <a:fillRect/>
+          </a:stretch>
+        </p:blipFill>
+        <p:spPr>
+          <a:xfrm>
+            <a:off x="1756326" y="1417638"/>
+            <a:ext cx="8679348" cy="4969514"/>
+          </a:xfrm>
+        </p:spPr>
+      </p:pic>
+    </p:spTree>
+    <p:extLst>
+      <p:ext uri="{BB962C8B-B14F-4D97-AF65-F5344CB8AC3E}">
+        <p14:creationId xmlns:p14="http://schemas.microsoft.com/office/powerpoint/2010/main" val="2004468463"/>
+      </p:ext>
+    </p:extLst>
+  </p:cSld>
+  <p:clrMapOvr>
+    <a:masterClrMapping/>
+  </p:clrMapOvr>
+  <mc:AlternateContent xmlns:mc="http://schemas.openxmlformats.org/markup-compatibility/2006">
+    <mc:Choice xmlns:p14="http://schemas.microsoft.com/office/powerpoint/2010/main" Requires="p14">
+      <p:transition spd="slow" p14:dur="1200"/>
+    </mc:Choice>
+    <mc:Fallback>
+      <p:transition spd="slow"/>
+    </mc:Fallback>
+  </mc:AlternateContent>
+</p:sld>
+</file>
+
+<file path=ppt/slides/slide14.xml><?xml version="1.0" encoding="utf-8"?>
+<p:sld xmlns:a="http://schemas.openxmlformats.org/drawingml/2006/main" xmlns:r="http://schemas.openxmlformats.org/officeDocument/2006/relationships" xmlns:p="http://schemas.openxmlformats.org/presentationml/2006/main">
+  <p:cSld>
+    <p:spTree>
+      <p:nvGrpSpPr>
+        <p:cNvPr id="1" name=""/>
+        <p:cNvGrpSpPr/>
+        <p:nvPr/>
+      </p:nvGrpSpPr>
+      <p:grpSpPr>
+        <a:xfrm>
+          <a:off x="0" y="0"/>
+          <a:ext cx="0" cy="0"/>
+          <a:chOff x="0" y="0"/>
+          <a:chExt cx="0" cy="0"/>
+        </a:xfrm>
+      </p:grpSpPr>
+      <p:sp>
+        <p:nvSpPr>
+          <p:cNvPr id="2" name="Title 1"/>
+          <p:cNvSpPr>
+            <a:spLocks noGrp="1"/>
+          </p:cNvSpPr>
+          <p:nvPr>
+            <p:ph type="title"/>
+          </p:nvPr>
+        </p:nvSpPr>
+        <p:spPr/>
+        <p:txBody>
+          <a:bodyPr/>
+          <a:lstStyle/>
+          <a:p>
+            <a:pPr algn="l"/>
+            <a:r>
               <a:rPr lang="en-US" altLang="ug-CN" dirty="0">
                 <a:effectLst/>
                 <a:latin typeface="Ubuntu" panose="020B0504030602030204" charset="0"/>
@@ -4678,7 +5230,7 @@
 </p:sld>
 </file>
 
-<file path=ppt/slides/slide12.xml><?xml version="1.0" encoding="utf-8"?>
+<file path=ppt/slides/slide15.xml><?xml version="1.0" encoding="utf-8"?>
 <p:sld xmlns:a="http://schemas.openxmlformats.org/drawingml/2006/main" xmlns:r="http://schemas.openxmlformats.org/officeDocument/2006/relationships" xmlns:p="http://schemas.openxmlformats.org/presentationml/2006/main">
   <p:cSld>
     <p:spTree>
@@ -4966,7 +5518,20 @@
                 <a:latin typeface="Ubuntu" panose="020B0504030602030204" charset="0"/>
                 <a:cs typeface="Ubuntu" panose="020B0504030602030204" charset="0"/>
               </a:rPr>
-              <a:t>Performance Measure</a:t>
+              <a:t>Confusion Matrix</a:t>
+            </a:r>
+          </a:p>
+          <a:p>
+            <a:pPr marL="457200" indent="-457200" algn="l">
+              <a:buFont typeface="+mj-lt"/>
+              <a:buAutoNum type="arabicPeriod"/>
+            </a:pPr>
+            <a:r>
+              <a:rPr lang="en-US" altLang="ar-EG" sz="2400" dirty="0">
+                <a:latin typeface="Ubuntu" panose="020B0504030602030204" charset="0"/>
+                <a:cs typeface="Ubuntu" panose="020B0504030602030204" charset="0"/>
+              </a:rPr>
+              <a:t>Evaluation Metrics</a:t>
             </a:r>
           </a:p>
         </p:txBody>
@@ -5066,8 +5631,8 @@
               <a:rPr lang="en-US" altLang="ar-EG" sz="2400" dirty="0">
                 <a:solidFill>
                   <a:schemeClr val="bg2">
-                    <a:lumMod val="60000"/>
-                    <a:lumOff val="40000"/>
+                    <a:lumMod val="40000"/>
+                    <a:lumOff val="60000"/>
                   </a:schemeClr>
                 </a:solidFill>
                 <a:latin typeface="Ubuntu" panose="020B0504030602030204" charset="0"/>
@@ -5085,14 +5650,33 @@
               <a:rPr lang="en-US" altLang="ar-EG" sz="2400" dirty="0">
                 <a:solidFill>
                   <a:schemeClr val="bg2">
-                    <a:lumMod val="60000"/>
-                    <a:lumOff val="40000"/>
+                    <a:lumMod val="40000"/>
+                    <a:lumOff val="60000"/>
                   </a:schemeClr>
                 </a:solidFill>
                 <a:latin typeface="Ubuntu" panose="020B0504030602030204" charset="0"/>
                 <a:cs typeface="Ubuntu" panose="020B0504030602030204" charset="0"/>
               </a:rPr>
-              <a:t>Performance Measure</a:t>
+              <a:t>Confusion Matrix</a:t>
+            </a:r>
+          </a:p>
+          <a:p>
+            <a:pPr marL="457200" indent="-457200" algn="l">
+              <a:buFont typeface="+mj-lt"/>
+              <a:buAutoNum type="arabicPeriod"/>
+            </a:pPr>
+            <a:r>
+              <a:rPr lang="en-US" altLang="ar-EG" sz="2400" dirty="0">
+                <a:solidFill>
+                  <a:schemeClr val="bg2">
+                    <a:lumMod val="40000"/>
+                    <a:lumOff val="60000"/>
+                  </a:schemeClr>
+                </a:solidFill>
+                <a:latin typeface="Ubuntu" panose="020B0504030602030204" charset="0"/>
+                <a:cs typeface="Ubuntu" panose="020B0504030602030204" charset="0"/>
+              </a:rPr>
+              <a:t>Evaluation Metrics</a:t>
             </a:r>
           </a:p>
         </p:txBody>
@@ -5100,7 +5684,7 @@
     </p:spTree>
     <p:extLst>
       <p:ext uri="{BB962C8B-B14F-4D97-AF65-F5344CB8AC3E}">
-        <p14:creationId xmlns:p14="http://schemas.microsoft.com/office/powerpoint/2010/main" val="1224925125"/>
+        <p14:creationId xmlns:p14="http://schemas.microsoft.com/office/powerpoint/2010/main" val="3884819873"/>
       </p:ext>
     </p:extLst>
   </p:cSld>
@@ -5317,8 +5901,8 @@
               <a:rPr lang="en-US" altLang="ar-EG" sz="2400" dirty="0">
                 <a:solidFill>
                   <a:schemeClr val="bg2">
-                    <a:lumMod val="60000"/>
-                    <a:lumOff val="40000"/>
+                    <a:lumMod val="40000"/>
+                    <a:lumOff val="60000"/>
                   </a:schemeClr>
                 </a:solidFill>
                 <a:latin typeface="Ubuntu" panose="020B0504030602030204" charset="0"/>
@@ -5349,14 +5933,33 @@
               <a:rPr lang="en-US" altLang="ar-EG" sz="2400" dirty="0">
                 <a:solidFill>
                   <a:schemeClr val="bg2">
-                    <a:lumMod val="60000"/>
-                    <a:lumOff val="40000"/>
+                    <a:lumMod val="40000"/>
+                    <a:lumOff val="60000"/>
                   </a:schemeClr>
                 </a:solidFill>
                 <a:latin typeface="Ubuntu" panose="020B0504030602030204" charset="0"/>
                 <a:cs typeface="Ubuntu" panose="020B0504030602030204" charset="0"/>
               </a:rPr>
-              <a:t>Performance Measure</a:t>
+              <a:t>Confusion Matrix</a:t>
+            </a:r>
+          </a:p>
+          <a:p>
+            <a:pPr marL="457200" indent="-457200" algn="l">
+              <a:buFont typeface="+mj-lt"/>
+              <a:buAutoNum type="arabicPeriod"/>
+            </a:pPr>
+            <a:r>
+              <a:rPr lang="en-US" altLang="ar-EG" sz="2400" dirty="0">
+                <a:solidFill>
+                  <a:schemeClr val="bg2">
+                    <a:lumMod val="40000"/>
+                    <a:lumOff val="60000"/>
+                  </a:schemeClr>
+                </a:solidFill>
+                <a:latin typeface="Ubuntu" panose="020B0504030602030204" charset="0"/>
+                <a:cs typeface="Ubuntu" panose="020B0504030602030204" charset="0"/>
+              </a:rPr>
+              <a:t>Evaluation Metrics</a:t>
             </a:r>
           </a:p>
         </p:txBody>
@@ -5364,7 +5967,7 @@
     </p:spTree>
     <p:extLst>
       <p:ext uri="{BB962C8B-B14F-4D97-AF65-F5344CB8AC3E}">
-        <p14:creationId xmlns:p14="http://schemas.microsoft.com/office/powerpoint/2010/main" val="2655343668"/>
+        <p14:creationId xmlns:p14="http://schemas.microsoft.com/office/powerpoint/2010/main" val="3274403429"/>
       </p:ext>
     </p:extLst>
   </p:cSld>
@@ -5502,7 +6105,7 @@
             <p:ph idx="1"/>
             <p:extLst>
               <p:ext uri="{D42A27DB-BD31-4B8C-83A1-F6EECF244321}">
-                <p14:modId xmlns:p14="http://schemas.microsoft.com/office/powerpoint/2010/main" val="2941150397"/>
+                <p14:modId xmlns:p14="http://schemas.microsoft.com/office/powerpoint/2010/main" val="72258815"/>
               </p:ext>
             </p:extLst>
           </p:nvPr>
@@ -5763,7 +6366,7 @@
                     <a:lstStyle/>
                     <a:p>
                       <a:r>
-                        <a:rPr lang="en-US" sz="1600" b="1" dirty="0"/>
+                        <a:rPr lang="en-US" sz="1600" b="1"/>
                         <a:t>Nature of Output</a:t>
                       </a:r>
                       <a:endParaRPr lang="en-US" sz="1600" dirty="0"/>
@@ -5814,9 +6417,10 @@
                     <a:lstStyle/>
                     <a:p>
                       <a:r>
-                        <a:rPr lang="en-US" sz="1600" dirty="0"/>
+                        <a:rPr lang="en-US" sz="1600"/>
                         <a:t>Regression and Classification</a:t>
                       </a:r>
+                      <a:endParaRPr lang="en-US" sz="1600" dirty="0"/>
                     </a:p>
                   </a:txBody>
                   <a:tcPr marL="53247" marR="53247" marT="26623" marB="26623" anchor="ctr">
@@ -5881,9 +6485,10 @@
                         <a:defRPr/>
                       </a:pPr>
                       <a:r>
-                        <a:rPr lang="en-US" sz="1600" dirty="0"/>
+                        <a:rPr lang="en-US" sz="1600"/>
                         <a:t>Regression and Classification</a:t>
                       </a:r>
+                      <a:endParaRPr lang="en-US" sz="1600" dirty="0"/>
                     </a:p>
                   </a:txBody>
                   <a:tcPr marL="53247" marR="53247" marT="26623" marB="26623" anchor="ctr">
@@ -5931,9 +6536,10 @@
                     <a:lstStyle/>
                     <a:p>
                       <a:r>
-                        <a:rPr lang="en-US" sz="1600" dirty="0"/>
+                        <a:rPr lang="en-US" sz="1600"/>
                         <a:t>Regression and Classification</a:t>
                       </a:r>
+                      <a:endParaRPr lang="en-US" sz="1600" dirty="0"/>
                     </a:p>
                   </a:txBody>
                   <a:tcPr marL="53247" marR="53247" marT="26623" marB="26623" anchor="ctr">
@@ -5988,7 +6594,7 @@
                     <a:lstStyle/>
                     <a:p>
                       <a:r>
-                        <a:rPr lang="en-US" sz="1600" b="1" dirty="0"/>
+                        <a:rPr lang="en-US" sz="1600" b="1"/>
                         <a:t>Decision Making</a:t>
                       </a:r>
                       <a:endParaRPr lang="en-US" sz="1600" dirty="0"/>
@@ -6039,9 +6645,10 @@
                     <a:lstStyle/>
                     <a:p>
                       <a:r>
-                        <a:rPr lang="en-US" sz="1600" dirty="0"/>
+                        <a:rPr lang="en-US" sz="1600"/>
                         <a:t>Decides based on how close things are in points</a:t>
                       </a:r>
+                      <a:endParaRPr lang="en-US" sz="1600" dirty="0"/>
                     </a:p>
                   </a:txBody>
                   <a:tcPr marL="53247" marR="53247" marT="26623" marB="26623" anchor="ctr">
@@ -6089,9 +6696,10 @@
                     <a:lstStyle/>
                     <a:p>
                       <a:r>
-                        <a:rPr lang="en-US" sz="1600" dirty="0"/>
+                        <a:rPr lang="en-US" sz="1600"/>
                         <a:t>Decides based on likelihoods or chances/probability</a:t>
                       </a:r>
+                      <a:endParaRPr lang="en-US" sz="1600" dirty="0"/>
                     </a:p>
                   </a:txBody>
                   <a:tcPr marL="53247" marR="53247" marT="26623" marB="26623" anchor="ctr">
@@ -6139,9 +6747,10 @@
                     <a:lstStyle/>
                     <a:p>
                       <a:r>
-                        <a:rPr lang="en-US" sz="1600" dirty="0"/>
+                        <a:rPr lang="en-US" sz="1600"/>
                         <a:t>Decides by following a tree-like structure</a:t>
                       </a:r>
+                      <a:endParaRPr lang="en-US" sz="1600" dirty="0"/>
                     </a:p>
                   </a:txBody>
                   <a:tcPr marL="53247" marR="53247" marT="26623" marB="26623" anchor="ctr">
@@ -6297,9 +6906,10 @@
                     <a:lstStyle/>
                     <a:p>
                       <a:r>
-                        <a:rPr lang="en-US" sz="1600" dirty="0"/>
+                        <a:rPr lang="en-US" sz="1600"/>
                         <a:t>Naive Bayes</a:t>
                       </a:r>
+                      <a:endParaRPr lang="en-US" sz="1600" dirty="0"/>
                     </a:p>
                   </a:txBody>
                   <a:tcPr marL="53247" marR="53247" marT="26623" marB="26623" anchor="ctr">
@@ -6407,7 +7017,7 @@
                         <a:rPr lang="en-US" sz="1600" b="1"/>
                         <a:t>Training Time</a:t>
                       </a:r>
-                      <a:endParaRPr lang="en-US" sz="1600"/>
+                      <a:endParaRPr lang="en-US" sz="1600" dirty="0"/>
                     </a:p>
                   </a:txBody>
                   <a:tcPr marL="53247" marR="53247" marT="26623" marB="26623" anchor="ctr">
@@ -7736,8 +8346,8 @@
               <a:rPr lang="en-US" altLang="ar-EG" sz="2400" dirty="0">
                 <a:solidFill>
                   <a:schemeClr val="bg2">
-                    <a:lumMod val="60000"/>
-                    <a:lumOff val="40000"/>
+                    <a:lumMod val="40000"/>
+                    <a:lumOff val="60000"/>
                   </a:schemeClr>
                 </a:solidFill>
                 <a:latin typeface="Ubuntu" panose="020B0504030602030204" charset="0"/>
@@ -7755,8 +8365,8 @@
               <a:rPr lang="en-US" altLang="ar-EG" sz="2400" dirty="0">
                 <a:solidFill>
                   <a:schemeClr val="bg2">
-                    <a:lumMod val="60000"/>
-                    <a:lumOff val="40000"/>
+                    <a:lumMod val="40000"/>
+                    <a:lumOff val="60000"/>
                   </a:schemeClr>
                 </a:solidFill>
                 <a:latin typeface="Ubuntu" panose="020B0504030602030204" charset="0"/>
@@ -7775,7 +8385,26 @@
                 <a:latin typeface="Ubuntu" panose="020B0504030602030204" charset="0"/>
                 <a:cs typeface="Ubuntu" panose="020B0504030602030204" charset="0"/>
               </a:rPr>
-              <a:t>Performance Measure</a:t>
+              <a:t>Confusion Matrix</a:t>
+            </a:r>
+          </a:p>
+          <a:p>
+            <a:pPr marL="457200" indent="-457200" algn="l">
+              <a:buFont typeface="+mj-lt"/>
+              <a:buAutoNum type="arabicPeriod"/>
+            </a:pPr>
+            <a:r>
+              <a:rPr lang="en-US" altLang="ar-EG" sz="2400" dirty="0">
+                <a:solidFill>
+                  <a:schemeClr val="bg2">
+                    <a:lumMod val="40000"/>
+                    <a:lumOff val="60000"/>
+                  </a:schemeClr>
+                </a:solidFill>
+                <a:latin typeface="Ubuntu" panose="020B0504030602030204" charset="0"/>
+                <a:cs typeface="Ubuntu" panose="020B0504030602030204" charset="0"/>
+              </a:rPr>
+              <a:t>Evaluation Metrics</a:t>
             </a:r>
           </a:p>
         </p:txBody>
@@ -7783,7 +8412,7 @@
     </p:spTree>
     <p:extLst>
       <p:ext uri="{BB962C8B-B14F-4D97-AF65-F5344CB8AC3E}">
-        <p14:creationId xmlns:p14="http://schemas.microsoft.com/office/powerpoint/2010/main" val="3475381099"/>
+        <p14:creationId xmlns:p14="http://schemas.microsoft.com/office/powerpoint/2010/main" val="2416834867"/>
       </p:ext>
     </p:extLst>
   </p:cSld>

</xml_diff>